<commit_message>
added .pptx and .pdf versions_mk2
</commit_message>
<xml_diff>
--- a/DS_experience_NTH.pptx
+++ b/DS_experience_NTH.pptx
@@ -3695,7 +3695,7 @@
         </p:blipFill>
         <p:spPr>
           <a:xfrm>
-            <a:off x="10252023" y="70198"/>
+            <a:off x="10612751" y="70197"/>
             <a:ext cx="1140501" cy="1050560"/>
           </a:xfrm>
           <a:prstGeom prst="rect">
@@ -3905,10 +3905,10 @@
       </p:sp>
       <p:pic>
         <p:nvPicPr>
-          <p:cNvPr id="12" name="Picture 11" descr="A blue and green gradient&#10;&#10;AI-generated content may be incorrect.">
-            <a:extLst>
-              <a:ext uri="{FF2B5EF4-FFF2-40B4-BE49-F238E27FC236}">
-                <a16:creationId xmlns:a16="http://schemas.microsoft.com/office/drawing/2014/main" id="{E15EC420-6D37-3AEA-B57F-653AE1205BAF}"/>
+          <p:cNvPr id="14" name="Picture 13" descr="A green and black rectangle&#10;&#10;AI-generated content may be incorrect.">
+            <a:extLst>
+              <a:ext uri="{FF2B5EF4-FFF2-40B4-BE49-F238E27FC236}">
+                <a16:creationId xmlns:a16="http://schemas.microsoft.com/office/drawing/2014/main" id="{6D56EB8B-04BC-AD75-93FC-0EEE445EC466}"/>
               </a:ext>
             </a:extLst>
           </p:cNvPr>
@@ -3930,9 +3930,9 @@
           </a:stretch>
         </p:blipFill>
         <p:spPr>
-          <a:xfrm>
-            <a:off x="453453" y="200981"/>
-            <a:ext cx="9798570" cy="394497"/>
+          <a:xfrm rot="10800000">
+            <a:off x="180845" y="270782"/>
+            <a:ext cx="10302955" cy="369332"/>
           </a:xfrm>
           <a:prstGeom prst="rect">
             <a:avLst/>

</xml_diff>

<commit_message>
added some buttons to link things.
</commit_message>
<xml_diff>
--- a/DS_experience_NTH.pptx
+++ b/DS_experience_NTH.pptx
@@ -107,6 +107,11 @@
       </a:defRPr>
     </a:lvl9pPr>
   </p:defaultTextStyle>
+  <p:extLst>
+    <p:ext uri="{EFAFB233-063F-42B5-8137-9DF3F51BA10A}">
+      <p15:sldGuideLst xmlns:p15="http://schemas.microsoft.com/office/powerpoint/2012/main"/>
+    </p:ext>
+  </p:extLst>
 </p:presentation>
 </file>
 
@@ -3733,11 +3738,11 @@
           <a:p>
             <a:r>
               <a:rPr lang="en-US" b="1" dirty="0"/>
-              <a:t>Summary – </a:t>
+              <a:t>Summary: </a:t>
             </a:r>
             <a:r>
               <a:rPr lang="en-US" b="1" i="1" dirty="0"/>
-              <a:t>The Signal and the Noise</a:t>
+              <a:t>The Signal and the Noise – Nate Silver</a:t>
             </a:r>
             <a:br>
               <a:rPr lang="en-US" dirty="0"/>
@@ -3796,7 +3801,7 @@
             </a:br>
             <a:r>
               <a:rPr lang="en-US" dirty="0"/>
-              <a:t>A cross-disciplinary synthesis of model use, user error, and the limits of prediction—like a Malcolm Gladwell-style overview for data thinkers. Silver reframes forecasting as both a science and an art, blending statistical rigor with real-world examples. The novelty lies in how he weaves together diverse fields—economics, sports, politics—to show both the power and the pitfalls of predictive models.</a:t>
+              <a:t>A cross-disciplinary synthesis of model use, user error, and the limits of prediction— a Malcolm Gladwell-style overview for data thinkers. Silver reframes forecasting as both a science and an art, blending statistical rigor with real-world examples. The novelty lies in how he weaves together diverse fields—economics, sports, politics—to show both the power and the pitfalls of predictive models.</a:t>
             </a:r>
           </a:p>
           <a:p>
@@ -3846,7 +3851,7 @@
         </p:nvSpPr>
         <p:spPr>
           <a:xfrm>
-            <a:off x="11576154" y="6384883"/>
+            <a:off x="11667058" y="6384883"/>
             <a:ext cx="306049" cy="365125"/>
           </a:xfrm>
         </p:spPr>
@@ -3855,10 +3860,18 @@
           <a:lstStyle/>
           <a:p>
             <a:fld id="{AB2B3CEB-832D-4C50-9202-460D45D6A3E2}" type="slidenum">
-              <a:rPr lang="en-US" sz="2000" b="1" smtClean="0"/>
+              <a:rPr lang="en-US" sz="2000" b="1" smtClean="0">
+                <a:solidFill>
+                  <a:srgbClr val="FF0000"/>
+                </a:solidFill>
+              </a:rPr>
               <a:t>1</a:t>
             </a:fld>
-            <a:endParaRPr lang="en-US" sz="2000" b="1" dirty="0"/>
+            <a:endParaRPr lang="en-US" sz="2000" b="1" dirty="0">
+              <a:solidFill>
+                <a:srgbClr val="FF0000"/>
+              </a:solidFill>
+            </a:endParaRPr>
           </a:p>
         </p:txBody>
       </p:sp>
@@ -3931,14 +3944,114 @@
         </p:blipFill>
         <p:spPr>
           <a:xfrm rot="10800000">
-            <a:off x="180845" y="270782"/>
-            <a:ext cx="10302955" cy="369332"/>
+            <a:off x="179882" y="115197"/>
+            <a:ext cx="10561820" cy="158510"/>
           </a:xfrm>
           <a:prstGeom prst="rect">
             <a:avLst/>
           </a:prstGeom>
         </p:spPr>
       </p:pic>
+      <p:sp>
+        <p:nvSpPr>
+          <p:cNvPr id="3" name="Rectangle: Rounded Corners 2">
+            <a:hlinkClick r:id="rId4" tooltip="[click] to see chapter summaries"/>
+            <a:extLst>
+              <a:ext uri="{FF2B5EF4-FFF2-40B4-BE49-F238E27FC236}">
+                <a16:creationId xmlns:a16="http://schemas.microsoft.com/office/drawing/2014/main" id="{FAF1F270-9614-492D-E00F-C24A0A0E5108}"/>
+              </a:ext>
+            </a:extLst>
+          </p:cNvPr>
+          <p:cNvSpPr/>
+          <p:nvPr/>
+        </p:nvSpPr>
+        <p:spPr>
+          <a:xfrm>
+            <a:off x="6414541" y="455076"/>
+            <a:ext cx="1140501" cy="525280"/>
+          </a:xfrm>
+          <a:prstGeom prst="roundRect">
+            <a:avLst/>
+          </a:prstGeom>
+        </p:spPr>
+        <p:style>
+          <a:lnRef idx="2">
+            <a:schemeClr val="accent1">
+              <a:shade val="15000"/>
+            </a:schemeClr>
+          </a:lnRef>
+          <a:fillRef idx="1">
+            <a:schemeClr val="accent1"/>
+          </a:fillRef>
+          <a:effectRef idx="0">
+            <a:schemeClr val="accent1"/>
+          </a:effectRef>
+          <a:fontRef idx="minor">
+            <a:schemeClr val="lt1"/>
+          </a:fontRef>
+        </p:style>
+        <p:txBody>
+          <a:bodyPr rtlCol="0" anchor="ctr"/>
+          <a:lstStyle/>
+          <a:p>
+            <a:pPr algn="ctr"/>
+            <a:r>
+              <a:rPr lang="en-US" sz="1400" dirty="0"/>
+              <a:t>Chapter Summaries</a:t>
+            </a:r>
+          </a:p>
+        </p:txBody>
+      </p:sp>
+      <p:sp>
+        <p:nvSpPr>
+          <p:cNvPr id="4" name="Rectangle: Rounded Corners 3">
+            <a:hlinkClick r:id="rId5" tooltip="[click] to see book on Amazon"/>
+            <a:extLst>
+              <a:ext uri="{FF2B5EF4-FFF2-40B4-BE49-F238E27FC236}">
+                <a16:creationId xmlns:a16="http://schemas.microsoft.com/office/drawing/2014/main" id="{F5A7893F-C4EE-F37D-B607-79B8C85126F0}"/>
+              </a:ext>
+            </a:extLst>
+          </p:cNvPr>
+          <p:cNvSpPr/>
+          <p:nvPr/>
+        </p:nvSpPr>
+        <p:spPr>
+          <a:xfrm>
+            <a:off x="8153400" y="455076"/>
+            <a:ext cx="1140501" cy="525280"/>
+          </a:xfrm>
+          <a:prstGeom prst="roundRect">
+            <a:avLst/>
+          </a:prstGeom>
+        </p:spPr>
+        <p:style>
+          <a:lnRef idx="2">
+            <a:schemeClr val="accent1">
+              <a:shade val="15000"/>
+            </a:schemeClr>
+          </a:lnRef>
+          <a:fillRef idx="1">
+            <a:schemeClr val="accent1"/>
+          </a:fillRef>
+          <a:effectRef idx="0">
+            <a:schemeClr val="accent1"/>
+          </a:effectRef>
+          <a:fontRef idx="minor">
+            <a:schemeClr val="lt1"/>
+          </a:fontRef>
+        </p:style>
+        <p:txBody>
+          <a:bodyPr rtlCol="0" anchor="ctr"/>
+          <a:lstStyle/>
+          <a:p>
+            <a:pPr algn="ctr"/>
+            <a:r>
+              <a:rPr lang="en-US" sz="1400" dirty="0"/>
+              <a:t>Purchase on Amazon</a:t>
+            </a:r>
+          </a:p>
+        </p:txBody>
+      </p:sp>
     </p:spTree>
     <p:extLst>
       <p:ext uri="{BB962C8B-B14F-4D97-AF65-F5344CB8AC3E}">

</xml_diff>

<commit_message>
added some buttons to link things_v2
</commit_message>
<xml_diff>
--- a/DS_experience_NTH.pptx
+++ b/DS_experience_NTH.pptx
@@ -3737,8 +3737,20 @@
           <a:lstStyle/>
           <a:p>
             <a:r>
-              <a:rPr lang="en-US" b="1" dirty="0"/>
-              <a:t>Summary: </a:t>
+              <a:rPr lang="en-US" b="1" dirty="0">
+                <a:solidFill>
+                  <a:srgbClr val="21918C"/>
+                </a:solidFill>
+              </a:rPr>
+              <a:t>Summary:</a:t>
+            </a:r>
+            <a:r>
+              <a:rPr lang="en-US" b="1" dirty="0">
+                <a:solidFill>
+                  <a:srgbClr val="440154"/>
+                </a:solidFill>
+              </a:rPr>
+              <a:t> </a:t>
             </a:r>
             <a:r>
               <a:rPr lang="en-US" b="1" i="1" dirty="0"/>
@@ -3793,7 +3805,11 @@
           </a:p>
           <a:p>
             <a:r>
-              <a:rPr lang="en-US" b="1" dirty="0"/>
+              <a:rPr lang="en-US" b="1" dirty="0">
+                <a:solidFill>
+                  <a:srgbClr val="21918C"/>
+                </a:solidFill>
+              </a:rPr>
               <a:t>What’s New?</a:t>
             </a:r>
             <a:br>
@@ -3809,7 +3825,11 @@
           </a:p>
           <a:p>
             <a:r>
-              <a:rPr lang="en-US" b="1" dirty="0"/>
+              <a:rPr lang="en-US" b="1" dirty="0">
+                <a:solidFill>
+                  <a:srgbClr val="21918C"/>
+                </a:solidFill>
+              </a:rPr>
               <a:t>Class Connection:</a:t>
             </a:r>
             <a:br>

</xml_diff>